<commit_message>
fixup! Added clear history button
</commit_message>
<xml_diff>
--- a/Documentation/diagrams.pptx
+++ b/Documentation/diagrams.pptx
@@ -6079,10 +6079,10 @@
       </p:grpSpPr>
       <p:grpSp>
         <p:nvGrpSpPr>
-          <p:cNvPr id="10" name="Ryhmä 9">
+          <p:cNvPr id="61" name="Ryhmä 60">
             <a:extLst>
               <a:ext uri="{FF2B5EF4-FFF2-40B4-BE49-F238E27FC236}">
-                <a16:creationId xmlns:a16="http://schemas.microsoft.com/office/drawing/2014/main" id="{DDF39868-C1C9-8B00-8C14-5A4E92AACB23}"/>
+                <a16:creationId xmlns:a16="http://schemas.microsoft.com/office/drawing/2014/main" id="{033722D8-668C-1833-F5B2-D3DB30DCC2E1}"/>
               </a:ext>
             </a:extLst>
           </p:cNvPr>
@@ -6091,10 +6091,10 @@
         </p:nvGrpSpPr>
         <p:grpSpPr>
           <a:xfrm>
-            <a:off x="2440525" y="1602870"/>
-            <a:ext cx="7310949" cy="3652260"/>
-            <a:chOff x="2440525" y="1602870"/>
-            <a:chExt cx="7310949" cy="3652260"/>
+            <a:off x="2440525" y="1409813"/>
+            <a:ext cx="7310949" cy="4038373"/>
+            <a:chOff x="2440525" y="1216757"/>
+            <a:chExt cx="7310949" cy="4038373"/>
           </a:xfrm>
         </p:grpSpPr>
         <p:pic>
@@ -6125,7 +6125,7 @@
           <p:spPr>
             <a:xfrm>
               <a:off x="4870014" y="1655130"/>
-              <a:ext cx="1992529" cy="3599999"/>
+              <a:ext cx="1992528" cy="3599999"/>
             </a:xfrm>
             <a:prstGeom prst="rect">
               <a:avLst/>
@@ -6590,15 +6590,15 @@
             </p:cNvPr>
             <p:cNvCxnSpPr>
               <a:cxnSpLocks/>
-              <a:stCxn id="35" idx="3"/>
-              <a:endCxn id="31" idx="1"/>
+              <a:stCxn id="35" idx="1"/>
+              <a:endCxn id="31" idx="3"/>
             </p:cNvCxnSpPr>
             <p:nvPr/>
           </p:nvCxnSpPr>
           <p:spPr>
-            <a:xfrm>
-              <a:off x="6023443" y="2140793"/>
-              <a:ext cx="1280208" cy="0"/>
+            <a:xfrm flipH="1" flipV="1">
+              <a:off x="4424145" y="1716551"/>
+              <a:ext cx="445870" cy="424242"/>
             </a:xfrm>
             <a:prstGeom prst="straightConnector1">
               <a:avLst/>
@@ -6639,7 +6639,7 @@
           </p:nvSpPr>
           <p:spPr>
             <a:xfrm>
-              <a:off x="7303651" y="1956127"/>
+              <a:off x="2826656" y="1531885"/>
               <a:ext cx="1597489" cy="369332"/>
             </a:xfrm>
             <a:prstGeom prst="rect">
@@ -6653,6 +6653,7 @@
             </a:bodyPr>
             <a:lstStyle/>
             <a:p>
+              <a:pPr algn="r"/>
               <a:r>
                 <a:rPr lang="fi-FI" dirty="0" err="1"/>
                 <a:t>Search</a:t>
@@ -7195,7 +7196,7 @@
           </p:nvSpPr>
           <p:spPr>
             <a:xfrm>
-              <a:off x="7300693" y="2309384"/>
+              <a:off x="7318842" y="1924882"/>
               <a:ext cx="1689373" cy="369332"/>
             </a:xfrm>
             <a:prstGeom prst="rect">
@@ -7230,15 +7231,16 @@
               </a:extLst>
             </p:cNvPr>
             <p:cNvCxnSpPr>
+              <a:cxnSpLocks/>
               <a:stCxn id="64" idx="6"/>
               <a:endCxn id="65" idx="1"/>
             </p:cNvCxnSpPr>
             <p:nvPr/>
           </p:nvCxnSpPr>
           <p:spPr>
-            <a:xfrm>
-              <a:off x="6814017" y="2294214"/>
-              <a:ext cx="486676" cy="199836"/>
+            <a:xfrm flipV="1">
+              <a:off x="6814017" y="2109548"/>
+              <a:ext cx="504825" cy="184666"/>
             </a:xfrm>
             <a:prstGeom prst="straightConnector1">
               <a:avLst/>
@@ -7328,15 +7330,15 @@
             </p:cNvPr>
             <p:cNvCxnSpPr>
               <a:cxnSpLocks/>
-              <a:stCxn id="79" idx="5"/>
+              <a:stCxn id="79" idx="7"/>
               <a:endCxn id="82" idx="1"/>
             </p:cNvCxnSpPr>
             <p:nvPr/>
           </p:nvCxnSpPr>
           <p:spPr>
-            <a:xfrm>
-              <a:off x="6347032" y="2350173"/>
-              <a:ext cx="953661" cy="457655"/>
+            <a:xfrm flipV="1">
+              <a:off x="6347032" y="1773757"/>
+              <a:ext cx="971810" cy="483094"/>
             </a:xfrm>
             <a:prstGeom prst="straightConnector1">
               <a:avLst/>
@@ -7377,7 +7379,7 @@
           </p:nvSpPr>
           <p:spPr>
             <a:xfrm>
-              <a:off x="7300693" y="2623162"/>
+              <a:off x="7318842" y="1589091"/>
               <a:ext cx="1408527" cy="369332"/>
             </a:xfrm>
             <a:prstGeom prst="rect">
@@ -7421,8 +7423,8 @@
           </p:nvSpPr>
           <p:spPr>
             <a:xfrm>
-              <a:off x="4894728" y="3343211"/>
-              <a:ext cx="579765" cy="190564"/>
+              <a:off x="4894729" y="3343211"/>
+              <a:ext cx="261940" cy="190564"/>
             </a:xfrm>
             <a:prstGeom prst="ellipse">
               <a:avLst/>
@@ -7478,7 +7480,7 @@
           <p:spPr>
             <a:xfrm flipH="1">
               <a:off x="4424145" y="3438493"/>
-              <a:ext cx="470583" cy="0"/>
+              <a:ext cx="470584" cy="0"/>
             </a:xfrm>
             <a:prstGeom prst="straightConnector1">
               <a:avLst/>
@@ -7564,8 +7566,8 @@
           </p:nvSpPr>
           <p:spPr>
             <a:xfrm>
-              <a:off x="6428255" y="3996985"/>
-              <a:ext cx="434288" cy="181716"/>
+              <a:off x="6428255" y="4031455"/>
+              <a:ext cx="434288" cy="147245"/>
             </a:xfrm>
             <a:prstGeom prst="ellipse">
               <a:avLst/>
@@ -7619,9 +7621,9 @@
             <p:nvPr/>
           </p:nvCxnSpPr>
           <p:spPr>
-            <a:xfrm>
-              <a:off x="6862543" y="4087843"/>
-              <a:ext cx="438150" cy="0"/>
+            <a:xfrm flipV="1">
+              <a:off x="6862543" y="4101310"/>
+              <a:ext cx="438150" cy="3768"/>
             </a:xfrm>
             <a:prstGeom prst="straightConnector1">
               <a:avLst/>
@@ -7662,7 +7664,7 @@
           </p:nvSpPr>
           <p:spPr>
             <a:xfrm>
-              <a:off x="7300693" y="3903177"/>
+              <a:off x="7300693" y="3916644"/>
               <a:ext cx="2450781" cy="369332"/>
             </a:xfrm>
             <a:prstGeom prst="rect">
@@ -7714,8 +7716,8 @@
           </p:nvSpPr>
           <p:spPr>
             <a:xfrm>
-              <a:off x="6470214" y="1856783"/>
-              <a:ext cx="343804" cy="177474"/>
+              <a:off x="6284119" y="1881189"/>
+              <a:ext cx="383381" cy="153068"/>
             </a:xfrm>
             <a:prstGeom prst="ellipse">
               <a:avLst/>
@@ -7770,8 +7772,8 @@
           </p:nvCxnSpPr>
           <p:spPr>
             <a:xfrm flipV="1">
-              <a:off x="6763669" y="1787536"/>
-              <a:ext cx="537024" cy="95237"/>
+              <a:off x="6611355" y="1401423"/>
+              <a:ext cx="689338" cy="502182"/>
             </a:xfrm>
             <a:prstGeom prst="straightConnector1">
               <a:avLst/>
@@ -7812,7 +7814,7 @@
           </p:nvSpPr>
           <p:spPr>
             <a:xfrm>
-              <a:off x="7300693" y="1602870"/>
+              <a:off x="7300693" y="1216757"/>
               <a:ext cx="1580241" cy="369332"/>
             </a:xfrm>
             <a:prstGeom prst="rect">
@@ -7837,6 +7839,156 @@
               <a:r>
                 <a:rPr lang="fi-FI" dirty="0" err="1"/>
                 <a:t>window</a:t>
+              </a:r>
+              <a:endParaRPr lang="fi-FI" dirty="0"/>
+            </a:p>
+          </p:txBody>
+        </p:sp>
+        <p:sp>
+          <p:nvSpPr>
+            <p:cNvPr id="46" name="Ellipsi 45">
+              <a:extLst>
+                <a:ext uri="{FF2B5EF4-FFF2-40B4-BE49-F238E27FC236}">
+                  <a16:creationId xmlns:a16="http://schemas.microsoft.com/office/drawing/2014/main" id="{251887BF-6C4B-5BE1-1C5F-B4E69A383FC5}"/>
+                </a:ext>
+              </a:extLst>
+            </p:cNvPr>
+            <p:cNvSpPr/>
+            <p:nvPr/>
+          </p:nvSpPr>
+          <p:spPr>
+            <a:xfrm>
+              <a:off x="6162675" y="2425545"/>
+              <a:ext cx="603249" cy="120267"/>
+            </a:xfrm>
+            <a:prstGeom prst="ellipse">
+              <a:avLst/>
+            </a:prstGeom>
+            <a:noFill/>
+            <a:ln>
+              <a:solidFill>
+                <a:srgbClr val="FF0000"/>
+              </a:solidFill>
+            </a:ln>
+          </p:spPr>
+          <p:style>
+            <a:lnRef idx="2">
+              <a:schemeClr val="accent1">
+                <a:shade val="15000"/>
+              </a:schemeClr>
+            </a:lnRef>
+            <a:fillRef idx="1">
+              <a:schemeClr val="accent1"/>
+            </a:fillRef>
+            <a:effectRef idx="0">
+              <a:schemeClr val="accent1"/>
+            </a:effectRef>
+            <a:fontRef idx="minor">
+              <a:schemeClr val="lt1"/>
+            </a:fontRef>
+          </p:style>
+          <p:txBody>
+            <a:bodyPr rtlCol="0" anchor="ctr"/>
+            <a:lstStyle/>
+            <a:p>
+              <a:pPr algn="ctr"/>
+              <a:endParaRPr lang="fi-FI"/>
+            </a:p>
+          </p:txBody>
+        </p:sp>
+        <p:cxnSp>
+          <p:nvCxnSpPr>
+            <p:cNvPr id="48" name="Suora nuoliyhdysviiva 47">
+              <a:extLst>
+                <a:ext uri="{FF2B5EF4-FFF2-40B4-BE49-F238E27FC236}">
+                  <a16:creationId xmlns:a16="http://schemas.microsoft.com/office/drawing/2014/main" id="{BBEB3111-1C5E-A69A-C2F4-BE61515BB378}"/>
+                </a:ext>
+              </a:extLst>
+            </p:cNvPr>
+            <p:cNvCxnSpPr>
+              <a:cxnSpLocks/>
+              <a:stCxn id="46" idx="6"/>
+              <a:endCxn id="49" idx="1"/>
+            </p:cNvCxnSpPr>
+            <p:nvPr/>
+          </p:nvCxnSpPr>
+          <p:spPr>
+            <a:xfrm flipV="1">
+              <a:off x="6765924" y="2485678"/>
+              <a:ext cx="534769" cy="1"/>
+            </a:xfrm>
+            <a:prstGeom prst="straightConnector1">
+              <a:avLst/>
+            </a:prstGeom>
+            <a:ln>
+              <a:solidFill>
+                <a:srgbClr val="FF0000"/>
+              </a:solidFill>
+              <a:tailEnd type="triangle"/>
+            </a:ln>
+          </p:spPr>
+          <p:style>
+            <a:lnRef idx="2">
+              <a:schemeClr val="accent1"/>
+            </a:lnRef>
+            <a:fillRef idx="0">
+              <a:schemeClr val="accent1"/>
+            </a:fillRef>
+            <a:effectRef idx="1">
+              <a:schemeClr val="accent1"/>
+            </a:effectRef>
+            <a:fontRef idx="minor">
+              <a:schemeClr val="tx1"/>
+            </a:fontRef>
+          </p:style>
+        </p:cxnSp>
+        <p:sp>
+          <p:nvSpPr>
+            <p:cNvPr id="49" name="Tekstiruutu 48">
+              <a:extLst>
+                <a:ext uri="{FF2B5EF4-FFF2-40B4-BE49-F238E27FC236}">
+                  <a16:creationId xmlns:a16="http://schemas.microsoft.com/office/drawing/2014/main" id="{59B04E06-B625-4CB3-08EF-E376783EF3EF}"/>
+                </a:ext>
+              </a:extLst>
+            </p:cNvPr>
+            <p:cNvSpPr txBox="1"/>
+            <p:nvPr/>
+          </p:nvSpPr>
+          <p:spPr>
+            <a:xfrm>
+              <a:off x="7300693" y="2301012"/>
+              <a:ext cx="2176621" cy="369332"/>
+            </a:xfrm>
+            <a:prstGeom prst="rect">
+              <a:avLst/>
+            </a:prstGeom>
+            <a:noFill/>
+          </p:spPr>
+          <p:txBody>
+            <a:bodyPr wrap="none" rtlCol="0">
+              <a:spAutoFit/>
+            </a:bodyPr>
+            <a:lstStyle/>
+            <a:p>
+              <a:r>
+                <a:rPr lang="fi-FI" dirty="0" err="1"/>
+                <a:t>Clear</a:t>
+              </a:r>
+              <a:r>
+                <a:rPr lang="fi-FI" dirty="0"/>
+                <a:t> </a:t>
+              </a:r>
+              <a:r>
+                <a:rPr lang="fi-FI" dirty="0" err="1"/>
+                <a:t>search</a:t>
+              </a:r>
+              <a:r>
+                <a:rPr lang="fi-FI" dirty="0"/>
+                <a:t> </a:t>
+              </a:r>
+              <a:r>
+                <a:rPr lang="fi-FI" dirty="0" err="1"/>
+                <a:t>history</a:t>
               </a:r>
               <a:endParaRPr lang="fi-FI" dirty="0"/>
             </a:p>

</xml_diff>